<commit_message>
* modified ppt, repaired sorting from query
</commit_message>
<xml_diff>
--- a/CRM PROJECT.pptx
+++ b/CRM PROJECT.pptx
@@ -12,8 +12,9 @@
     <p:sldId id="260" r:id="rId6"/>
     <p:sldId id="263" r:id="rId7"/>
     <p:sldId id="264" r:id="rId8"/>
-    <p:sldId id="261" r:id="rId9"/>
-    <p:sldId id="262" r:id="rId10"/>
+    <p:sldId id="265" r:id="rId9"/>
+    <p:sldId id="261" r:id="rId10"/>
+    <p:sldId id="262" r:id="rId11"/>
   </p:sldIdLst>
   <p:sldSz cx="12192000" cy="6858000"/>
   <p:notesSz cx="6858000" cy="9144000"/>
@@ -3729,6 +3730,104 @@
 </p:sld>
 </file>
 
+<file path=ppt/slides/slide10.xml><?xml version="1.0" encoding="utf-8"?>
+<p:sld xmlns:a="http://schemas.openxmlformats.org/drawingml/2006/main" xmlns:r="http://schemas.openxmlformats.org/officeDocument/2006/relationships" xmlns:p="http://schemas.openxmlformats.org/presentationml/2006/main">
+  <p:cSld>
+    <p:spTree>
+      <p:nvGrpSpPr>
+        <p:cNvPr id="1" name=""/>
+        <p:cNvGrpSpPr/>
+        <p:nvPr/>
+      </p:nvGrpSpPr>
+      <p:grpSpPr>
+        <a:xfrm>
+          <a:off x="0" y="0"/>
+          <a:ext cx="0" cy="0"/>
+          <a:chOff x="0" y="0"/>
+          <a:chExt cx="0" cy="0"/>
+        </a:xfrm>
+      </p:grpSpPr>
+      <p:sp>
+        <p:nvSpPr>
+          <p:cNvPr id="2" name="TextBox 1"/>
+          <p:cNvSpPr txBox="1"/>
+          <p:nvPr/>
+        </p:nvSpPr>
+        <p:spPr>
+          <a:xfrm>
+            <a:off x="1057275" y="785813"/>
+            <a:ext cx="8415338" cy="369332"/>
+          </a:xfrm>
+          <a:prstGeom prst="rect">
+            <a:avLst/>
+          </a:prstGeom>
+          <a:noFill/>
+        </p:spPr>
+        <p:txBody>
+          <a:bodyPr wrap="square" rtlCol="0">
+            <a:spAutoFit/>
+          </a:bodyPr>
+          <a:lstStyle/>
+          <a:p>
+            <a:pPr marL="285750" indent="-285750">
+              <a:buFont typeface="Arial" panose="020B0604020202020204" pitchFamily="34" charset="0"/>
+              <a:buChar char="•"/>
+            </a:pPr>
+            <a:endParaRPr lang="en-US" dirty="0"/>
+          </a:p>
+        </p:txBody>
+      </p:sp>
+      <p:sp>
+        <p:nvSpPr>
+          <p:cNvPr id="3" name="TextBox 2">
+            <a:extLst>
+              <a:ext uri="{FF2B5EF4-FFF2-40B4-BE49-F238E27FC236}">
+                <a16:creationId xmlns:a16="http://schemas.microsoft.com/office/drawing/2014/main" id="{8AC78D0D-66A1-4A19-905E-11FD10D52662}"/>
+              </a:ext>
+            </a:extLst>
+          </p:cNvPr>
+          <p:cNvSpPr txBox="1"/>
+          <p:nvPr/>
+        </p:nvSpPr>
+        <p:spPr>
+          <a:xfrm flipH="1">
+            <a:off x="841056" y="601147"/>
+            <a:ext cx="9717406" cy="646331"/>
+          </a:xfrm>
+          <a:prstGeom prst="rect">
+            <a:avLst/>
+          </a:prstGeom>
+          <a:noFill/>
+        </p:spPr>
+        <p:txBody>
+          <a:bodyPr wrap="square" rtlCol="0">
+            <a:spAutoFit/>
+          </a:bodyPr>
+          <a:lstStyle/>
+          <a:p>
+            <a:r>
+              <a:rPr lang="en-CA" dirty="0"/>
+              <a:t>What we learned:</a:t>
+            </a:r>
+          </a:p>
+          <a:p>
+            <a:endParaRPr lang="en-CA" dirty="0"/>
+          </a:p>
+        </p:txBody>
+      </p:sp>
+    </p:spTree>
+    <p:extLst>
+      <p:ext uri="{BB962C8B-B14F-4D97-AF65-F5344CB8AC3E}">
+        <p14:creationId xmlns:p14="http://schemas.microsoft.com/office/powerpoint/2010/main" val="1641692"/>
+      </p:ext>
+    </p:extLst>
+  </p:cSld>
+  <p:clrMapOvr>
+    <a:masterClrMapping/>
+  </p:clrMapOvr>
+</p:sld>
+</file>
+
 <file path=ppt/slides/slide2.xml><?xml version="1.0" encoding="utf-8"?>
 <p:sld xmlns:a="http://schemas.openxmlformats.org/drawingml/2006/main" xmlns:r="http://schemas.openxmlformats.org/officeDocument/2006/relationships" xmlns:p="http://schemas.openxmlformats.org/presentationml/2006/main">
   <p:cSld>
@@ -4471,8 +4570,16 @@
           <a:lstStyle/>
           <a:p>
             <a:r>
+              <a:rPr lang="en-CA" dirty="0" smtClean="0"/>
+              <a:t>Store</a:t>
+            </a:r>
+            <a:r>
+              <a:rPr lang="en-CA" dirty="0" smtClean="0"/>
+              <a:t> </a:t>
+            </a:r>
+            <a:r>
               <a:rPr lang="en-CA" dirty="0"/>
-              <a:t>Keep User id from Login Screen</a:t>
+              <a:t>User id from Login Screen</a:t>
             </a:r>
           </a:p>
         </p:txBody>
@@ -4884,6 +4991,54 @@
           </a:p>
         </p:txBody>
       </p:sp>
+      <p:pic>
+        <p:nvPicPr>
+          <p:cNvPr id="3" name="Picture 2"/>
+          <p:cNvPicPr>
+            <a:picLocks noChangeAspect="1"/>
+          </p:cNvPicPr>
+          <p:nvPr/>
+        </p:nvPicPr>
+        <p:blipFill>
+          <a:blip r:embed="rId2"/>
+          <a:stretch>
+            <a:fillRect/>
+          </a:stretch>
+        </p:blipFill>
+        <p:spPr>
+          <a:xfrm>
+            <a:off x="6610138" y="2216731"/>
+            <a:ext cx="5462800" cy="2912481"/>
+          </a:xfrm>
+          <a:prstGeom prst="rect">
+            <a:avLst/>
+          </a:prstGeom>
+        </p:spPr>
+      </p:pic>
+      <p:pic>
+        <p:nvPicPr>
+          <p:cNvPr id="4" name="Picture 3"/>
+          <p:cNvPicPr>
+            <a:picLocks noChangeAspect="1"/>
+          </p:cNvPicPr>
+          <p:nvPr/>
+        </p:nvPicPr>
+        <p:blipFill>
+          <a:blip r:embed="rId3"/>
+          <a:stretch>
+            <a:fillRect/>
+          </a:stretch>
+        </p:blipFill>
+        <p:spPr>
+          <a:xfrm>
+            <a:off x="49306" y="3400425"/>
+            <a:ext cx="6448425" cy="3457575"/>
+          </a:xfrm>
+          <a:prstGeom prst="rect">
+            <a:avLst/>
+          </a:prstGeom>
+        </p:spPr>
+      </p:pic>
     </p:spTree>
     <p:extLst>
       <p:ext uri="{BB962C8B-B14F-4D97-AF65-F5344CB8AC3E}">
@@ -4914,6 +5069,137 @@
           <a:chExt cx="0" cy="0"/>
         </a:xfrm>
       </p:grpSpPr>
+      <p:pic>
+        <p:nvPicPr>
+          <p:cNvPr id="4" name="Picture 3"/>
+          <p:cNvPicPr>
+            <a:picLocks noChangeAspect="1"/>
+          </p:cNvPicPr>
+          <p:nvPr/>
+        </p:nvPicPr>
+        <p:blipFill>
+          <a:blip r:embed="rId2"/>
+          <a:stretch>
+            <a:fillRect/>
+          </a:stretch>
+        </p:blipFill>
+        <p:spPr>
+          <a:xfrm>
+            <a:off x="5491802" y="257765"/>
+            <a:ext cx="6661593" cy="1762125"/>
+          </a:xfrm>
+          <a:prstGeom prst="rect">
+            <a:avLst/>
+          </a:prstGeom>
+        </p:spPr>
+      </p:pic>
+      <p:sp>
+        <p:nvSpPr>
+          <p:cNvPr id="5" name="TextBox 4"/>
+          <p:cNvSpPr txBox="1"/>
+          <p:nvPr/>
+        </p:nvSpPr>
+        <p:spPr>
+          <a:xfrm>
+            <a:off x="504968" y="723330"/>
+            <a:ext cx="4067032" cy="523220"/>
+          </a:xfrm>
+          <a:prstGeom prst="rect">
+            <a:avLst/>
+          </a:prstGeom>
+          <a:noFill/>
+        </p:spPr>
+        <p:txBody>
+          <a:bodyPr wrap="square" rtlCol="0">
+            <a:spAutoFit/>
+          </a:bodyPr>
+          <a:lstStyle/>
+          <a:p>
+            <a:r>
+              <a:rPr lang="en-CA" sz="2800" b="1" dirty="0" smtClean="0"/>
+              <a:t>Sorting Without MVVM</a:t>
+            </a:r>
+          </a:p>
+        </p:txBody>
+      </p:sp>
+      <p:pic>
+        <p:nvPicPr>
+          <p:cNvPr id="6" name="Picture 5"/>
+          <p:cNvPicPr>
+            <a:picLocks noChangeAspect="1"/>
+          </p:cNvPicPr>
+          <p:nvPr/>
+        </p:nvPicPr>
+        <p:blipFill>
+          <a:blip r:embed="rId3"/>
+          <a:stretch>
+            <a:fillRect/>
+          </a:stretch>
+        </p:blipFill>
+        <p:spPr>
+          <a:xfrm>
+            <a:off x="5491802" y="2112773"/>
+            <a:ext cx="6661593" cy="4745227"/>
+          </a:xfrm>
+          <a:prstGeom prst="rect">
+            <a:avLst/>
+          </a:prstGeom>
+        </p:spPr>
+      </p:pic>
+      <p:pic>
+        <p:nvPicPr>
+          <p:cNvPr id="7" name="Picture 6"/>
+          <p:cNvPicPr>
+            <a:picLocks noChangeAspect="1"/>
+          </p:cNvPicPr>
+          <p:nvPr/>
+        </p:nvPicPr>
+        <p:blipFill>
+          <a:blip r:embed="rId4"/>
+          <a:stretch>
+            <a:fillRect/>
+          </a:stretch>
+        </p:blipFill>
+        <p:spPr>
+          <a:xfrm>
+            <a:off x="0" y="3115598"/>
+            <a:ext cx="5724525" cy="790575"/>
+          </a:xfrm>
+          <a:prstGeom prst="rect">
+            <a:avLst/>
+          </a:prstGeom>
+        </p:spPr>
+      </p:pic>
+    </p:spTree>
+    <p:extLst>
+      <p:ext uri="{BB962C8B-B14F-4D97-AF65-F5344CB8AC3E}">
+        <p14:creationId xmlns:p14="http://schemas.microsoft.com/office/powerpoint/2010/main" val="2384295362"/>
+      </p:ext>
+    </p:extLst>
+  </p:cSld>
+  <p:clrMapOvr>
+    <a:masterClrMapping/>
+  </p:clrMapOvr>
+</p:sld>
+</file>
+
+<file path=ppt/slides/slide9.xml><?xml version="1.0" encoding="utf-8"?>
+<p:sld xmlns:a="http://schemas.openxmlformats.org/drawingml/2006/main" xmlns:r="http://schemas.openxmlformats.org/officeDocument/2006/relationships" xmlns:p="http://schemas.openxmlformats.org/presentationml/2006/main">
+  <p:cSld>
+    <p:spTree>
+      <p:nvGrpSpPr>
+        <p:cNvPr id="1" name=""/>
+        <p:cNvGrpSpPr/>
+        <p:nvPr/>
+      </p:nvGrpSpPr>
+      <p:grpSpPr>
+        <a:xfrm>
+          <a:off x="0" y="0"/>
+          <a:ext cx="0" cy="0"/>
+          <a:chOff x="0" y="0"/>
+          <a:chExt cx="0" cy="0"/>
+        </a:xfrm>
+      </p:grpSpPr>
       <p:sp>
         <p:nvSpPr>
           <p:cNvPr id="2" name="TextBox 1"/>
@@ -5029,104 +5315,6 @@
     <p:extLst>
       <p:ext uri="{BB962C8B-B14F-4D97-AF65-F5344CB8AC3E}">
         <p14:creationId xmlns:p14="http://schemas.microsoft.com/office/powerpoint/2010/main" val="1781100221"/>
-      </p:ext>
-    </p:extLst>
-  </p:cSld>
-  <p:clrMapOvr>
-    <a:masterClrMapping/>
-  </p:clrMapOvr>
-</p:sld>
-</file>
-
-<file path=ppt/slides/slide9.xml><?xml version="1.0" encoding="utf-8"?>
-<p:sld xmlns:a="http://schemas.openxmlformats.org/drawingml/2006/main" xmlns:r="http://schemas.openxmlformats.org/officeDocument/2006/relationships" xmlns:p="http://schemas.openxmlformats.org/presentationml/2006/main">
-  <p:cSld>
-    <p:spTree>
-      <p:nvGrpSpPr>
-        <p:cNvPr id="1" name=""/>
-        <p:cNvGrpSpPr/>
-        <p:nvPr/>
-      </p:nvGrpSpPr>
-      <p:grpSpPr>
-        <a:xfrm>
-          <a:off x="0" y="0"/>
-          <a:ext cx="0" cy="0"/>
-          <a:chOff x="0" y="0"/>
-          <a:chExt cx="0" cy="0"/>
-        </a:xfrm>
-      </p:grpSpPr>
-      <p:sp>
-        <p:nvSpPr>
-          <p:cNvPr id="2" name="TextBox 1"/>
-          <p:cNvSpPr txBox="1"/>
-          <p:nvPr/>
-        </p:nvSpPr>
-        <p:spPr>
-          <a:xfrm>
-            <a:off x="1057275" y="785813"/>
-            <a:ext cx="8415338" cy="369332"/>
-          </a:xfrm>
-          <a:prstGeom prst="rect">
-            <a:avLst/>
-          </a:prstGeom>
-          <a:noFill/>
-        </p:spPr>
-        <p:txBody>
-          <a:bodyPr wrap="square" rtlCol="0">
-            <a:spAutoFit/>
-          </a:bodyPr>
-          <a:lstStyle/>
-          <a:p>
-            <a:pPr marL="285750" indent="-285750">
-              <a:buFont typeface="Arial" panose="020B0604020202020204" pitchFamily="34" charset="0"/>
-              <a:buChar char="•"/>
-            </a:pPr>
-            <a:endParaRPr lang="en-US" dirty="0"/>
-          </a:p>
-        </p:txBody>
-      </p:sp>
-      <p:sp>
-        <p:nvSpPr>
-          <p:cNvPr id="3" name="TextBox 2">
-            <a:extLst>
-              <a:ext uri="{FF2B5EF4-FFF2-40B4-BE49-F238E27FC236}">
-                <a16:creationId xmlns:a16="http://schemas.microsoft.com/office/drawing/2014/main" id="{8AC78D0D-66A1-4A19-905E-11FD10D52662}"/>
-              </a:ext>
-            </a:extLst>
-          </p:cNvPr>
-          <p:cNvSpPr txBox="1"/>
-          <p:nvPr/>
-        </p:nvSpPr>
-        <p:spPr>
-          <a:xfrm flipH="1">
-            <a:off x="841056" y="601147"/>
-            <a:ext cx="9717406" cy="646331"/>
-          </a:xfrm>
-          <a:prstGeom prst="rect">
-            <a:avLst/>
-          </a:prstGeom>
-          <a:noFill/>
-        </p:spPr>
-        <p:txBody>
-          <a:bodyPr wrap="square" rtlCol="0">
-            <a:spAutoFit/>
-          </a:bodyPr>
-          <a:lstStyle/>
-          <a:p>
-            <a:r>
-              <a:rPr lang="en-CA" dirty="0"/>
-              <a:t>What we learned:</a:t>
-            </a:r>
-          </a:p>
-          <a:p>
-            <a:endParaRPr lang="en-CA" dirty="0"/>
-          </a:p>
-        </p:txBody>
-      </p:sp>
-    </p:spTree>
-    <p:extLst>
-      <p:ext uri="{BB962C8B-B14F-4D97-AF65-F5344CB8AC3E}">
-        <p14:creationId xmlns:p14="http://schemas.microsoft.com/office/powerpoint/2010/main" val="1641692"/>
       </p:ext>
     </p:extLst>
   </p:cSld>

</xml_diff>